<commit_message>
Changed userMock -> personMock on slide 7
</commit_message>
<xml_diff>
--- a/AutoFixture_LightningTalk.pptx
+++ b/AutoFixture_LightningTalk.pptx
@@ -255,7 +255,7 @@
           <a:p>
             <a:fld id="{D767EAEA-49F6-47D1-81B5-6AE13276E2F7}" type="datetimeFigureOut">
               <a:rPr lang="pl-PL" smtClean="0"/>
-              <a:t>12.03.2016</a:t>
+              <a:t>14.03.2016</a:t>
             </a:fld>
             <a:endParaRPr lang="pl-PL"/>
           </a:p>
@@ -425,7 +425,7 @@
           <a:p>
             <a:fld id="{153FA37D-DE2B-47E9-A168-88AE1559A114}" type="datetimeFigureOut">
               <a:rPr lang="pl-PL" smtClean="0"/>
-              <a:t>12.03.2016</a:t>
+              <a:t>14.03.2016</a:t>
             </a:fld>
             <a:endParaRPr lang="pl-PL"/>
           </a:p>
@@ -12197,7 +12197,7 @@
           <a:graphicData uri="http://schemas.openxmlformats.org/presentationml/2006/ole">
             <mc:AlternateContent xmlns:mc="http://schemas.openxmlformats.org/markup-compatibility/2006">
               <mc:Choice xmlns:v="urn:schemas-microsoft-com:vml" Requires="v">
-                <p:oleObj spid="_x0000_s3211" name="Packager Shell Object" showAsIcon="1" r:id="rId3" imgW="2243160" imgH="534600" progId="Package">
+                <p:oleObj spid="_x0000_s3214" name="Packager Shell Object" showAsIcon="1" r:id="rId3" imgW="2243160" imgH="534600" progId="Package">
                   <p:embed/>
                 </p:oleObj>
               </mc:Choice>
@@ -12254,7 +12254,7 @@
           <a:graphicData uri="http://schemas.openxmlformats.org/presentationml/2006/ole">
             <mc:AlternateContent xmlns:mc="http://schemas.openxmlformats.org/markup-compatibility/2006">
               <mc:Choice xmlns:v="urn:schemas-microsoft-com:vml" Requires="v">
-                <p:oleObj spid="_x0000_s3212" name="Packager Shell Object" showAsIcon="1" r:id="rId5" imgW="1689840" imgH="534600" progId="Package">
+                <p:oleObj spid="_x0000_s3215" name="Packager Shell Object" showAsIcon="1" r:id="rId5" imgW="1689840" imgH="534600" progId="Package">
                   <p:embed/>
                 </p:oleObj>
               </mc:Choice>
@@ -12311,7 +12311,7 @@
           <a:graphicData uri="http://schemas.openxmlformats.org/presentationml/2006/ole">
             <mc:AlternateContent xmlns:mc="http://schemas.openxmlformats.org/markup-compatibility/2006">
               <mc:Choice xmlns:v="urn:schemas-microsoft-com:vml" Requires="v">
-                <p:oleObj spid="_x0000_s3213" name="Packager Shell Object" showAsIcon="1" r:id="rId7" imgW="2045520" imgH="534600" progId="Package">
+                <p:oleObj spid="_x0000_s3216" name="Packager Shell Object" showAsIcon="1" r:id="rId7" imgW="2045520" imgH="534600" progId="Package">
                   <p:embed/>
                 </p:oleObj>
               </mc:Choice>
@@ -19987,7 +19987,6 @@
               <a:rPr lang="pl-PL" dirty="0"/>
               <a:t>https://github.com/MichalJankowskii/AutoFixture.LightningTalk</a:t>
             </a:r>
-            <a:endParaRPr lang="pl-PL" dirty="0"/>
           </a:p>
         </p:txBody>
       </p:sp>
@@ -27043,7 +27042,33 @@
                 <a:effectLst/>
                 <a:latin typeface="Consolas" panose="020B0609020204030204" pitchFamily="49" charset="0"/>
               </a:rPr>
-              <a:t> userMock = fixture.Create&lt;</a:t>
+              <a:t> </a:t>
+            </a:r>
+            <a:r>
+              <a:rPr kumimoji="0" lang="pl-PL" altLang="pl-PL" sz="1200" b="0" i="0" u="none" strike="noStrike" cap="none" normalizeH="0" baseline="0" dirty="0" err="1" smtClean="0">
+                <a:ln>
+                  <a:noFill/>
+                </a:ln>
+                <a:solidFill>
+                  <a:srgbClr val="000000"/>
+                </a:solidFill>
+                <a:effectLst/>
+                <a:latin typeface="Consolas" panose="020B0609020204030204" pitchFamily="49" charset="0"/>
+              </a:rPr>
+              <a:t>personMock</a:t>
+            </a:r>
+            <a:r>
+              <a:rPr kumimoji="0" lang="pl-PL" altLang="pl-PL" sz="1200" b="0" i="0" u="none" strike="noStrike" cap="none" normalizeH="0" baseline="0" dirty="0" smtClean="0">
+                <a:ln>
+                  <a:noFill/>
+                </a:ln>
+                <a:solidFill>
+                  <a:srgbClr val="000000"/>
+                </a:solidFill>
+                <a:effectLst/>
+                <a:latin typeface="Consolas" panose="020B0609020204030204" pitchFamily="49" charset="0"/>
+              </a:rPr>
+              <a:t> = fixture.Create&lt;</a:t>
             </a:r>
             <a:r>
               <a:rPr kumimoji="0" lang="pl-PL" altLang="pl-PL" sz="1200" b="0" i="0" u="none" strike="noStrike" cap="none" normalizeH="0" baseline="0" dirty="0" smtClean="0">
@@ -27116,17 +27141,43 @@
               <a:tabLst/>
             </a:pPr>
             <a:r>
-              <a:rPr kumimoji="0" lang="pl-PL" altLang="pl-PL" sz="1200" b="0" i="0" u="none" strike="noStrike" cap="none" normalizeH="0" baseline="0" dirty="0" smtClean="0">
-                <a:ln>
-                  <a:noFill/>
-                </a:ln>
-                <a:solidFill>
-                  <a:srgbClr val="000000"/>
-                </a:solidFill>
-                <a:effectLst/>
-                <a:latin typeface="Consolas" panose="020B0609020204030204" pitchFamily="49" charset="0"/>
-              </a:rPr>
-              <a:t>userMock.SetupProperty(u =&gt; u.FirstName, </a:t>
+              <a:rPr kumimoji="0" lang="pl-PL" altLang="pl-PL" sz="1200" b="0" i="0" u="none" strike="noStrike" cap="none" normalizeH="0" baseline="0" dirty="0" err="1" smtClean="0">
+                <a:ln>
+                  <a:noFill/>
+                </a:ln>
+                <a:solidFill>
+                  <a:srgbClr val="000000"/>
+                </a:solidFill>
+                <a:effectLst/>
+                <a:latin typeface="Consolas" panose="020B0609020204030204" pitchFamily="49" charset="0"/>
+              </a:rPr>
+              <a:t>personMock.SetupProperty</a:t>
+            </a:r>
+            <a:r>
+              <a:rPr kumimoji="0" lang="pl-PL" altLang="pl-PL" sz="1200" b="0" i="0" u="none" strike="noStrike" cap="none" normalizeH="0" baseline="0" dirty="0" smtClean="0">
+                <a:ln>
+                  <a:noFill/>
+                </a:ln>
+                <a:solidFill>
+                  <a:srgbClr val="000000"/>
+                </a:solidFill>
+                <a:effectLst/>
+                <a:latin typeface="Consolas" panose="020B0609020204030204" pitchFamily="49" charset="0"/>
+              </a:rPr>
+              <a:t>(u</a:t>
+            </a:r>
+            <a:r>
+              <a:rPr kumimoji="0" lang="pl-PL" altLang="pl-PL" sz="1200" b="0" i="0" u="none" strike="noStrike" cap="none" normalizeH="0" baseline="0" dirty="0" smtClean="0">
+                <a:ln>
+                  <a:noFill/>
+                </a:ln>
+                <a:solidFill>
+                  <a:srgbClr val="000000"/>
+                </a:solidFill>
+                <a:effectLst/>
+                <a:latin typeface="Consolas" panose="020B0609020204030204" pitchFamily="49" charset="0"/>
+              </a:rPr>
+              <a:t> =&gt; u.FirstName, </a:t>
             </a:r>
             <a:r>
               <a:rPr kumimoji="0" lang="pl-PL" altLang="pl-PL" sz="1200" b="0" i="0" u="none" strike="noStrike" cap="none" normalizeH="0" baseline="0" dirty="0" smtClean="0">
@@ -32864,15 +32915,6 @@
 </file>
 
 <file path=customXml/item1.xml><?xml version="1.0" encoding="utf-8"?>
-<?mso-contentType ?>
-<FormTemplates xmlns="http://schemas.microsoft.com/sharepoint/v3/contenttype/forms">
-  <Display>DocumentLibraryForm</Display>
-  <Edit>DocumentLibraryForm</Edit>
-  <New>DocumentLibraryForm</New>
-</FormTemplates>
-</file>
-
-<file path=customXml/item2.xml><?xml version="1.0" encoding="utf-8"?>
 <p:properties xmlns:p="http://schemas.microsoft.com/office/2006/metadata/properties" xmlns:xsi="http://www.w3.org/2001/XMLSchema-instance" xmlns:pc="http://schemas.microsoft.com/office/infopath/2007/PartnerControls">
   <documentManagement>
     <Approved_x0020_by xmlns="5dd3191a-cb4c-49ff-b444-ed92889b1301">
@@ -32900,6 +32942,15 @@
     <Expiration_x0020_Date0 xmlns="5dd3191a-cb4c-49ff-b444-ed92889b1301" xsi:nil="true"/>
   </documentManagement>
 </p:properties>
+</file>
+
+<file path=customXml/item2.xml><?xml version="1.0" encoding="utf-8"?>
+<?mso-contentType ?>
+<FormTemplates xmlns="http://schemas.microsoft.com/sharepoint/v3/contenttype/forms">
+  <Display>DocumentLibraryForm</Display>
+  <Edit>DocumentLibraryForm</Edit>
+  <New>DocumentLibraryForm</New>
+</FormTemplates>
 </file>
 
 <file path=customXml/item3.xml><?xml version="1.0" encoding="utf-8"?>
@@ -33095,14 +33146,6 @@
 </file>
 
 <file path=customXml/itemProps1.xml><?xml version="1.0" encoding="utf-8"?>
-<ds:datastoreItem xmlns:ds="http://schemas.openxmlformats.org/officeDocument/2006/customXml" ds:itemID="{4F33D784-6CAB-430D-ABF6-23CB7DEA62B3}">
-  <ds:schemaRefs>
-    <ds:schemaRef ds:uri="http://schemas.microsoft.com/sharepoint/v3/contenttype/forms"/>
-  </ds:schemaRefs>
-</ds:datastoreItem>
-</file>
-
-<file path=customXml/itemProps2.xml><?xml version="1.0" encoding="utf-8"?>
 <ds:datastoreItem xmlns:ds="http://schemas.openxmlformats.org/officeDocument/2006/customXml" ds:itemID="{5F2F14B6-0560-42CB-ABE2-4AF83C58B94C}">
   <ds:schemaRefs>
     <ds:schemaRef ds:uri="http://purl.org/dc/elements/1.1/"/>
@@ -33114,6 +33157,14 @@
     <ds:schemaRef ds:uri="http://schemas.microsoft.com/office/infopath/2007/PartnerControls"/>
     <ds:schemaRef ds:uri="http://schemas.microsoft.com/office/2006/documentManagement/types"/>
     <ds:schemaRef ds:uri="http://www.w3.org/XML/1998/namespace"/>
+  </ds:schemaRefs>
+</ds:datastoreItem>
+</file>
+
+<file path=customXml/itemProps2.xml><?xml version="1.0" encoding="utf-8"?>
+<ds:datastoreItem xmlns:ds="http://schemas.openxmlformats.org/officeDocument/2006/customXml" ds:itemID="{4F33D784-6CAB-430D-ABF6-23CB7DEA62B3}">
+  <ds:schemaRefs>
+    <ds:schemaRef ds:uri="http://schemas.microsoft.com/sharepoint/v3/contenttype/forms"/>
   </ds:schemaRefs>
 </ds:datastoreItem>
 </file>

</xml_diff>